<commit_message>
Added Supervisor to README
</commit_message>
<xml_diff>
--- a/Documents/Semester 1 Presentation.pptx
+++ b/Documents/Semester 1 Presentation.pptx
@@ -618,7 +618,7 @@
           <a:p>
             <a:fld id="{2E3F47AE-4804-4655-8D11-C2BEE1A314EC}" type="datetimeFigureOut">
               <a:rPr lang="en-GB" smtClean="0"/>
-              <a:t>12/11/2021</a:t>
+              <a:t>30/11/2021</a:t>
             </a:fld>
             <a:endParaRPr lang="en-GB"/>
           </a:p>
@@ -914,7 +914,7 @@
           <a:p>
             <a:fld id="{2E3F47AE-4804-4655-8D11-C2BEE1A314EC}" type="datetimeFigureOut">
               <a:rPr lang="en-GB" smtClean="0"/>
-              <a:t>12/11/2021</a:t>
+              <a:t>30/11/2021</a:t>
             </a:fld>
             <a:endParaRPr lang="en-GB"/>
           </a:p>
@@ -1162,7 +1162,7 @@
           <a:p>
             <a:fld id="{2E3F47AE-4804-4655-8D11-C2BEE1A314EC}" type="datetimeFigureOut">
               <a:rPr lang="en-GB" smtClean="0"/>
-              <a:t>12/11/2021</a:t>
+              <a:t>30/11/2021</a:t>
             </a:fld>
             <a:endParaRPr lang="en-GB"/>
           </a:p>
@@ -1702,7 +1702,7 @@
           <a:p>
             <a:fld id="{2E3F47AE-4804-4655-8D11-C2BEE1A314EC}" type="datetimeFigureOut">
               <a:rPr lang="en-GB" smtClean="0"/>
-              <a:t>12/11/2021</a:t>
+              <a:t>30/11/2021</a:t>
             </a:fld>
             <a:endParaRPr lang="en-GB"/>
           </a:p>
@@ -1950,7 +1950,7 @@
           <a:p>
             <a:fld id="{2E3F47AE-4804-4655-8D11-C2BEE1A314EC}" type="datetimeFigureOut">
               <a:rPr lang="en-GB" smtClean="0"/>
-              <a:t>12/11/2021</a:t>
+              <a:t>30/11/2021</a:t>
             </a:fld>
             <a:endParaRPr lang="en-GB"/>
           </a:p>
@@ -2482,7 +2482,7 @@
           <a:p>
             <a:fld id="{2E3F47AE-4804-4655-8D11-C2BEE1A314EC}" type="datetimeFigureOut">
               <a:rPr lang="en-GB" smtClean="0"/>
-              <a:t>12/11/2021</a:t>
+              <a:t>30/11/2021</a:t>
             </a:fld>
             <a:endParaRPr lang="en-GB"/>
           </a:p>
@@ -2779,7 +2779,7 @@
           <a:p>
             <a:fld id="{2E3F47AE-4804-4655-8D11-C2BEE1A314EC}" type="datetimeFigureOut">
               <a:rPr lang="en-GB" smtClean="0"/>
-              <a:t>12/11/2021</a:t>
+              <a:t>30/11/2021</a:t>
             </a:fld>
             <a:endParaRPr lang="en-GB"/>
           </a:p>
@@ -2953,7 +2953,7 @@
           <a:p>
             <a:fld id="{2E3F47AE-4804-4655-8D11-C2BEE1A314EC}" type="datetimeFigureOut">
               <a:rPr lang="en-GB" smtClean="0"/>
-              <a:t>12/11/2021</a:t>
+              <a:t>30/11/2021</a:t>
             </a:fld>
             <a:endParaRPr lang="en-GB"/>
           </a:p>
@@ -3133,7 +3133,7 @@
           <a:p>
             <a:fld id="{2E3F47AE-4804-4655-8D11-C2BEE1A314EC}" type="datetimeFigureOut">
               <a:rPr lang="en-GB" smtClean="0"/>
-              <a:t>12/11/2021</a:t>
+              <a:t>30/11/2021</a:t>
             </a:fld>
             <a:endParaRPr lang="en-GB"/>
           </a:p>
@@ -3303,7 +3303,7 @@
           <a:p>
             <a:fld id="{2E3F47AE-4804-4655-8D11-C2BEE1A314EC}" type="datetimeFigureOut">
               <a:rPr lang="en-GB" smtClean="0"/>
-              <a:t>12/11/2021</a:t>
+              <a:t>30/11/2021</a:t>
             </a:fld>
             <a:endParaRPr lang="en-GB"/>
           </a:p>
@@ -3554,7 +3554,7 @@
           <a:p>
             <a:fld id="{2E3F47AE-4804-4655-8D11-C2BEE1A314EC}" type="datetimeFigureOut">
               <a:rPr lang="en-GB" smtClean="0"/>
-              <a:t>12/11/2021</a:t>
+              <a:t>30/11/2021</a:t>
             </a:fld>
             <a:endParaRPr lang="en-GB"/>
           </a:p>
@@ -3851,7 +3851,7 @@
           <a:p>
             <a:fld id="{2E3F47AE-4804-4655-8D11-C2BEE1A314EC}" type="datetimeFigureOut">
               <a:rPr lang="en-GB" smtClean="0"/>
-              <a:t>12/11/2021</a:t>
+              <a:t>30/11/2021</a:t>
             </a:fld>
             <a:endParaRPr lang="en-GB"/>
           </a:p>
@@ -4293,7 +4293,7 @@
           <a:p>
             <a:fld id="{2E3F47AE-4804-4655-8D11-C2BEE1A314EC}" type="datetimeFigureOut">
               <a:rPr lang="en-GB" smtClean="0"/>
-              <a:t>12/11/2021</a:t>
+              <a:t>30/11/2021</a:t>
             </a:fld>
             <a:endParaRPr lang="en-GB"/>
           </a:p>
@@ -4411,7 +4411,7 @@
           <a:p>
             <a:fld id="{2E3F47AE-4804-4655-8D11-C2BEE1A314EC}" type="datetimeFigureOut">
               <a:rPr lang="en-GB" smtClean="0"/>
-              <a:t>12/11/2021</a:t>
+              <a:t>30/11/2021</a:t>
             </a:fld>
             <a:endParaRPr lang="en-GB"/>
           </a:p>
@@ -4506,7 +4506,7 @@
           <a:p>
             <a:fld id="{2E3F47AE-4804-4655-8D11-C2BEE1A314EC}" type="datetimeFigureOut">
               <a:rPr lang="en-GB" smtClean="0"/>
-              <a:t>12/11/2021</a:t>
+              <a:t>30/11/2021</a:t>
             </a:fld>
             <a:endParaRPr lang="en-GB"/>
           </a:p>
@@ -4789,7 +4789,7 @@
           <a:p>
             <a:fld id="{2E3F47AE-4804-4655-8D11-C2BEE1A314EC}" type="datetimeFigureOut">
               <a:rPr lang="en-GB" smtClean="0"/>
-              <a:t>12/11/2021</a:t>
+              <a:t>30/11/2021</a:t>
             </a:fld>
             <a:endParaRPr lang="en-GB"/>
           </a:p>
@@ -5080,7 +5080,7 @@
           <a:p>
             <a:fld id="{2E3F47AE-4804-4655-8D11-C2BEE1A314EC}" type="datetimeFigureOut">
               <a:rPr lang="en-GB" smtClean="0"/>
-              <a:t>12/11/2021</a:t>
+              <a:t>30/11/2021</a:t>
             </a:fld>
             <a:endParaRPr lang="en-GB"/>
           </a:p>
@@ -5610,7 +5610,7 @@
           <a:p>
             <a:fld id="{2E3F47AE-4804-4655-8D11-C2BEE1A314EC}" type="datetimeFigureOut">
               <a:rPr lang="en-GB" smtClean="0"/>
-              <a:t>12/11/2021</a:t>
+              <a:t>30/11/2021</a:t>
             </a:fld>
             <a:endParaRPr lang="en-GB"/>
           </a:p>
@@ -6665,111 +6665,561 @@
           <a:chExt cx="0" cy="0"/>
         </a:xfrm>
       </p:grpSpPr>
-      <p:sp>
-        <p:nvSpPr>
-          <p:cNvPr id="2" name="Title 1"/>
-          <p:cNvSpPr>
-            <a:spLocks noGrp="1"/>
-          </p:cNvSpPr>
-          <p:nvPr>
-            <p:ph type="ctrTitle"/>
-          </p:nvPr>
-        </p:nvSpPr>
-        <p:spPr>
-          <a:xfrm>
-            <a:off x="1441621" y="914400"/>
-            <a:ext cx="9144000" cy="915044"/>
-          </a:xfrm>
-        </p:spPr>
-        <p:txBody>
-          <a:bodyPr>
-            <a:normAutofit fontScale="90000"/>
-          </a:bodyPr>
-          <a:lstStyle/>
-          <a:p>
-            <a:r>
-              <a:rPr lang="en-GB" dirty="0">
-                <a:solidFill>
-                  <a:srgbClr val="C00000"/>
-                </a:solidFill>
-              </a:rPr>
-              <a:t>Technologies &amp; System Architecture</a:t>
-            </a:r>
-          </a:p>
-        </p:txBody>
-      </p:sp>
-      <p:sp>
-        <p:nvSpPr>
-          <p:cNvPr id="7" name="Subtitle 2">
+      <p:grpSp>
+        <p:nvGrpSpPr>
+          <p:cNvPr id="24" name="Group 23">
             <a:extLst>
               <a:ext uri="{FF2B5EF4-FFF2-40B4-BE49-F238E27FC236}">
-                <a16:creationId xmlns:a16="http://schemas.microsoft.com/office/drawing/2014/main" id="{815E248E-A4A5-0944-B1A7-08C933F531A8}"/>
+                <a16:creationId xmlns:a16="http://schemas.microsoft.com/office/drawing/2014/main" id="{7C4701A3-3D6D-42FA-8644-28DD72092E48}"/>
+              </a:ext>
+              <a:ext uri="{C183D7F6-B498-43B3-948B-1728B52AA6E4}">
+                <adec:decorative xmlns:adec="http://schemas.microsoft.com/office/drawing/2017/decorative" val="1"/>
               </a:ext>
             </a:extLst>
           </p:cNvPr>
-          <p:cNvSpPr>
-            <a:spLocks noGrp="1"/>
-          </p:cNvSpPr>
-          <p:nvPr>
-            <p:ph type="subTitle" idx="1"/>
+          <p:cNvGrpSpPr>
+            <a:grpSpLocks noGrp="1" noUngrp="1" noRot="1" noChangeAspect="1" noMove="1" noResize="1"/>
+          </p:cNvGrpSpPr>
+          <p:nvPr>
+            <p:extLst>
+              <p:ext uri="{386F3935-93C4-4BCD-93E2-E3B085C9AB24}">
+                <p16:designElem xmlns:p16="http://schemas.microsoft.com/office/powerpoint/2015/main" val="1"/>
+              </p:ext>
+            </p:extLst>
+          </p:nvPr>
+        </p:nvGrpSpPr>
+        <p:grpSpPr>
+          <a:xfrm>
+            <a:off x="150812" y="0"/>
+            <a:ext cx="2436813" cy="6858001"/>
+            <a:chOff x="1320800" y="0"/>
+            <a:chExt cx="2436813" cy="6858001"/>
+          </a:xfrm>
+        </p:grpSpPr>
+        <p:sp>
+          <p:nvSpPr>
+            <p:cNvPr id="25" name="Freeform 6">
+              <a:extLst>
+                <a:ext uri="{FF2B5EF4-FFF2-40B4-BE49-F238E27FC236}">
+                  <a16:creationId xmlns:a16="http://schemas.microsoft.com/office/drawing/2014/main" id="{D33274CE-8F73-480E-BAF8-722873419E57}"/>
+                </a:ext>
+                <a:ext uri="{C183D7F6-B498-43B3-948B-1728B52AA6E4}">
+                  <adec:decorative xmlns:adec="http://schemas.microsoft.com/office/drawing/2017/decorative" val="1"/>
+                </a:ext>
+              </a:extLst>
+            </p:cNvPr>
+            <p:cNvSpPr/>
+            <p:nvPr>
+              <p:extLst>
+                <p:ext uri="{386F3935-93C4-4BCD-93E2-E3B085C9AB24}">
+                  <p16:designElem xmlns:p16="http://schemas.microsoft.com/office/powerpoint/2015/main" val="1"/>
+                </p:ext>
+              </p:extLst>
+            </p:nvPr>
+          </p:nvSpPr>
+          <p:spPr bwMode="auto">
+            <a:xfrm>
+              <a:off x="1627188" y="0"/>
+              <a:ext cx="1122363" cy="5329238"/>
+            </a:xfrm>
+            <a:custGeom>
+              <a:avLst/>
+              <a:gdLst/>
+              <a:ahLst/>
+              <a:cxnLst/>
+              <a:rect l="0" t="0" r="r" b="b"/>
+              <a:pathLst>
+                <a:path w="707" h="3357">
+                  <a:moveTo>
+                    <a:pt x="0" y="3330"/>
+                  </a:moveTo>
+                  <a:lnTo>
+                    <a:pt x="156" y="3357"/>
+                  </a:lnTo>
+                  <a:lnTo>
+                    <a:pt x="707" y="0"/>
+                  </a:lnTo>
+                  <a:lnTo>
+                    <a:pt x="547" y="0"/>
+                  </a:lnTo>
+                  <a:lnTo>
+                    <a:pt x="0" y="3330"/>
+                  </a:lnTo>
+                  <a:close/>
+                </a:path>
+              </a:pathLst>
+            </a:custGeom>
+            <a:solidFill>
+              <a:schemeClr val="accent1"/>
+            </a:solidFill>
+            <a:ln>
+              <a:noFill/>
+            </a:ln>
+          </p:spPr>
+        </p:sp>
+        <p:sp>
+          <p:nvSpPr>
+            <p:cNvPr id="26" name="Freeform 7">
+              <a:extLst>
+                <a:ext uri="{FF2B5EF4-FFF2-40B4-BE49-F238E27FC236}">
+                  <a16:creationId xmlns:a16="http://schemas.microsoft.com/office/drawing/2014/main" id="{D0BAF3BC-4420-466A-8861-1C03A04FD4CD}"/>
+                </a:ext>
+                <a:ext uri="{C183D7F6-B498-43B3-948B-1728B52AA6E4}">
+                  <adec:decorative xmlns:adec="http://schemas.microsoft.com/office/drawing/2017/decorative" val="1"/>
+                </a:ext>
+              </a:extLst>
+            </p:cNvPr>
+            <p:cNvSpPr/>
+            <p:nvPr>
+              <p:extLst>
+                <p:ext uri="{386F3935-93C4-4BCD-93E2-E3B085C9AB24}">
+                  <p16:designElem xmlns:p16="http://schemas.microsoft.com/office/powerpoint/2015/main" val="1"/>
+                </p:ext>
+              </p:extLst>
+            </p:nvPr>
+          </p:nvSpPr>
+          <p:spPr bwMode="auto">
+            <a:xfrm>
+              <a:off x="1320800" y="0"/>
+              <a:ext cx="1117600" cy="5276850"/>
+            </a:xfrm>
+            <a:custGeom>
+              <a:avLst/>
+              <a:gdLst/>
+              <a:ahLst/>
+              <a:cxnLst/>
+              <a:rect l="0" t="0" r="r" b="b"/>
+              <a:pathLst>
+                <a:path w="704" h="3324">
+                  <a:moveTo>
+                    <a:pt x="704" y="0"/>
+                  </a:moveTo>
+                  <a:lnTo>
+                    <a:pt x="545" y="0"/>
+                  </a:lnTo>
+                  <a:lnTo>
+                    <a:pt x="0" y="3300"/>
+                  </a:lnTo>
+                  <a:lnTo>
+                    <a:pt x="157" y="3324"/>
+                  </a:lnTo>
+                  <a:lnTo>
+                    <a:pt x="704" y="0"/>
+                  </a:lnTo>
+                  <a:close/>
+                </a:path>
+              </a:pathLst>
+            </a:custGeom>
+            <a:solidFill>
+              <a:schemeClr val="tx1">
+                <a:lumMod val="65000"/>
+                <a:lumOff val="35000"/>
+              </a:schemeClr>
+            </a:solidFill>
+            <a:ln>
+              <a:noFill/>
+            </a:ln>
+          </p:spPr>
+        </p:sp>
+        <p:sp>
+          <p:nvSpPr>
+            <p:cNvPr id="27" name="Freeform 8">
+              <a:extLst>
+                <a:ext uri="{FF2B5EF4-FFF2-40B4-BE49-F238E27FC236}">
+                  <a16:creationId xmlns:a16="http://schemas.microsoft.com/office/drawing/2014/main" id="{D80AC67D-51B3-46CA-9369-3CA515D28079}"/>
+                </a:ext>
+                <a:ext uri="{C183D7F6-B498-43B3-948B-1728B52AA6E4}">
+                  <adec:decorative xmlns:adec="http://schemas.microsoft.com/office/drawing/2017/decorative" val="1"/>
+                </a:ext>
+              </a:extLst>
+            </p:cNvPr>
+            <p:cNvSpPr/>
+            <p:nvPr>
+              <p:extLst>
+                <p:ext uri="{386F3935-93C4-4BCD-93E2-E3B085C9AB24}">
+                  <p16:designElem xmlns:p16="http://schemas.microsoft.com/office/powerpoint/2015/main" val="1"/>
+                </p:ext>
+              </p:extLst>
+            </p:nvPr>
+          </p:nvSpPr>
+          <p:spPr bwMode="auto">
+            <a:xfrm>
+              <a:off x="1320800" y="5238750"/>
+              <a:ext cx="1228725" cy="1619250"/>
+            </a:xfrm>
+            <a:custGeom>
+              <a:avLst/>
+              <a:gdLst/>
+              <a:ahLst/>
+              <a:cxnLst/>
+              <a:rect l="0" t="0" r="r" b="b"/>
+              <a:pathLst>
+                <a:path w="774" h="1020">
+                  <a:moveTo>
+                    <a:pt x="0" y="0"/>
+                  </a:moveTo>
+                  <a:lnTo>
+                    <a:pt x="740" y="1020"/>
+                  </a:lnTo>
+                  <a:lnTo>
+                    <a:pt x="774" y="1020"/>
+                  </a:lnTo>
+                  <a:lnTo>
+                    <a:pt x="0" y="0"/>
+                  </a:lnTo>
+                  <a:close/>
+                </a:path>
+              </a:pathLst>
+            </a:custGeom>
+            <a:solidFill>
+              <a:schemeClr val="tx1">
+                <a:lumMod val="85000"/>
+                <a:lumOff val="15000"/>
+              </a:schemeClr>
+            </a:solidFill>
+            <a:ln>
+              <a:noFill/>
+            </a:ln>
+          </p:spPr>
+        </p:sp>
+        <p:sp>
+          <p:nvSpPr>
+            <p:cNvPr id="28" name="Freeform 9">
+              <a:extLst>
+                <a:ext uri="{FF2B5EF4-FFF2-40B4-BE49-F238E27FC236}">
+                  <a16:creationId xmlns:a16="http://schemas.microsoft.com/office/drawing/2014/main" id="{F38229F7-00D7-4AE1-A345-621CD08D958E}"/>
+                </a:ext>
+                <a:ext uri="{C183D7F6-B498-43B3-948B-1728B52AA6E4}">
+                  <adec:decorative xmlns:adec="http://schemas.microsoft.com/office/drawing/2017/decorative" val="1"/>
+                </a:ext>
+              </a:extLst>
+            </p:cNvPr>
+            <p:cNvSpPr/>
+            <p:nvPr>
+              <p:extLst>
+                <p:ext uri="{386F3935-93C4-4BCD-93E2-E3B085C9AB24}">
+                  <p16:designElem xmlns:p16="http://schemas.microsoft.com/office/powerpoint/2015/main" val="1"/>
+                </p:ext>
+              </p:extLst>
+            </p:nvPr>
+          </p:nvSpPr>
+          <p:spPr bwMode="auto">
+            <a:xfrm>
+              <a:off x="1627188" y="5291138"/>
+              <a:ext cx="1495425" cy="1566863"/>
+            </a:xfrm>
+            <a:custGeom>
+              <a:avLst/>
+              <a:gdLst/>
+              <a:ahLst/>
+              <a:cxnLst/>
+              <a:rect l="0" t="0" r="r" b="b"/>
+              <a:pathLst>
+                <a:path w="942" h="987">
+                  <a:moveTo>
+                    <a:pt x="0" y="0"/>
+                  </a:moveTo>
+                  <a:lnTo>
+                    <a:pt x="909" y="987"/>
+                  </a:lnTo>
+                  <a:lnTo>
+                    <a:pt x="942" y="987"/>
+                  </a:lnTo>
+                  <a:lnTo>
+                    <a:pt x="0" y="0"/>
+                  </a:lnTo>
+                  <a:close/>
+                </a:path>
+              </a:pathLst>
+            </a:custGeom>
+            <a:solidFill>
+              <a:schemeClr val="accent1">
+                <a:lumMod val="50000"/>
+              </a:schemeClr>
+            </a:solidFill>
+            <a:ln>
+              <a:noFill/>
+            </a:ln>
+          </p:spPr>
+        </p:sp>
+        <p:sp>
+          <p:nvSpPr>
+            <p:cNvPr id="29" name="Freeform 10">
+              <a:extLst>
+                <a:ext uri="{FF2B5EF4-FFF2-40B4-BE49-F238E27FC236}">
+                  <a16:creationId xmlns:a16="http://schemas.microsoft.com/office/drawing/2014/main" id="{01646703-6EA8-4CBE-BCAE-23177639513F}"/>
+                </a:ext>
+                <a:ext uri="{C183D7F6-B498-43B3-948B-1728B52AA6E4}">
+                  <adec:decorative xmlns:adec="http://schemas.microsoft.com/office/drawing/2017/decorative" val="1"/>
+                </a:ext>
+              </a:extLst>
+            </p:cNvPr>
+            <p:cNvSpPr/>
+            <p:nvPr>
+              <p:extLst>
+                <p:ext uri="{386F3935-93C4-4BCD-93E2-E3B085C9AB24}">
+                  <p16:designElem xmlns:p16="http://schemas.microsoft.com/office/powerpoint/2015/main" val="1"/>
+                </p:ext>
+              </p:extLst>
+            </p:nvPr>
+          </p:nvSpPr>
+          <p:spPr bwMode="auto">
+            <a:xfrm>
+              <a:off x="1627188" y="5286375"/>
+              <a:ext cx="2130425" cy="1571625"/>
+            </a:xfrm>
+            <a:custGeom>
+              <a:avLst/>
+              <a:gdLst/>
+              <a:ahLst/>
+              <a:cxnLst/>
+              <a:rect l="0" t="0" r="r" b="b"/>
+              <a:pathLst>
+                <a:path w="1342" h="990">
+                  <a:moveTo>
+                    <a:pt x="0" y="3"/>
+                  </a:moveTo>
+                  <a:lnTo>
+                    <a:pt x="942" y="990"/>
+                  </a:lnTo>
+                  <a:lnTo>
+                    <a:pt x="1342" y="990"/>
+                  </a:lnTo>
+                  <a:lnTo>
+                    <a:pt x="156" y="27"/>
+                  </a:lnTo>
+                  <a:lnTo>
+                    <a:pt x="0" y="0"/>
+                  </a:lnTo>
+                  <a:lnTo>
+                    <a:pt x="0" y="3"/>
+                  </a:lnTo>
+                  <a:close/>
+                </a:path>
+              </a:pathLst>
+            </a:custGeom>
+            <a:solidFill>
+              <a:schemeClr val="accent1">
+                <a:lumMod val="75000"/>
+              </a:schemeClr>
+            </a:solidFill>
+            <a:ln>
+              <a:noFill/>
+            </a:ln>
+          </p:spPr>
+        </p:sp>
+        <p:sp>
+          <p:nvSpPr>
+            <p:cNvPr id="30" name="Freeform 11">
+              <a:extLst>
+                <a:ext uri="{FF2B5EF4-FFF2-40B4-BE49-F238E27FC236}">
+                  <a16:creationId xmlns:a16="http://schemas.microsoft.com/office/drawing/2014/main" id="{936068F1-777C-49D9-B6D9-24889A6E9240}"/>
+                </a:ext>
+                <a:ext uri="{C183D7F6-B498-43B3-948B-1728B52AA6E4}">
+                  <adec:decorative xmlns:adec="http://schemas.microsoft.com/office/drawing/2017/decorative" val="1"/>
+                </a:ext>
+              </a:extLst>
+            </p:cNvPr>
+            <p:cNvSpPr/>
+            <p:nvPr>
+              <p:extLst>
+                <p:ext uri="{386F3935-93C4-4BCD-93E2-E3B085C9AB24}">
+                  <p16:designElem xmlns:p16="http://schemas.microsoft.com/office/powerpoint/2015/main" val="1"/>
+                </p:ext>
+              </p:extLst>
+            </p:nvPr>
+          </p:nvSpPr>
+          <p:spPr bwMode="auto">
+            <a:xfrm>
+              <a:off x="1320800" y="5238750"/>
+              <a:ext cx="1695450" cy="1619250"/>
+            </a:xfrm>
+            <a:custGeom>
+              <a:avLst/>
+              <a:gdLst/>
+              <a:ahLst/>
+              <a:cxnLst/>
+              <a:rect l="0" t="0" r="r" b="b"/>
+              <a:pathLst>
+                <a:path w="1068" h="1020">
+                  <a:moveTo>
+                    <a:pt x="1068" y="1020"/>
+                  </a:moveTo>
+                  <a:lnTo>
+                    <a:pt x="184" y="60"/>
+                  </a:lnTo>
+                  <a:lnTo>
+                    <a:pt x="154" y="27"/>
+                  </a:lnTo>
+                  <a:lnTo>
+                    <a:pt x="157" y="27"/>
+                  </a:lnTo>
+                  <a:lnTo>
+                    <a:pt x="157" y="24"/>
+                  </a:lnTo>
+                  <a:lnTo>
+                    <a:pt x="154" y="24"/>
+                  </a:lnTo>
+                  <a:lnTo>
+                    <a:pt x="0" y="0"/>
+                  </a:lnTo>
+                  <a:lnTo>
+                    <a:pt x="0" y="0"/>
+                  </a:lnTo>
+                  <a:lnTo>
+                    <a:pt x="774" y="1020"/>
+                  </a:lnTo>
+                  <a:lnTo>
+                    <a:pt x="1068" y="1020"/>
+                  </a:lnTo>
+                  <a:close/>
+                </a:path>
+              </a:pathLst>
+            </a:custGeom>
+            <a:solidFill>
+              <a:schemeClr val="tx1">
+                <a:lumMod val="75000"/>
+                <a:lumOff val="25000"/>
+              </a:schemeClr>
+            </a:solidFill>
+            <a:ln>
+              <a:noFill/>
+            </a:ln>
+          </p:spPr>
+        </p:sp>
+      </p:grpSp>
+      <p:sp>
+        <p:nvSpPr>
+          <p:cNvPr id="31" name="Title 1">
+            <a:extLst>
+              <a:ext uri="{FF2B5EF4-FFF2-40B4-BE49-F238E27FC236}">
+                <a16:creationId xmlns:a16="http://schemas.microsoft.com/office/drawing/2014/main" id="{6CEA3F87-5826-44A1-88F0-6025FA3ADFE1}"/>
+              </a:ext>
+            </a:extLst>
+          </p:cNvPr>
+          <p:cNvSpPr>
+            <a:spLocks noGrp="1"/>
+          </p:cNvSpPr>
+          <p:nvPr>
+            <p:ph type="ctrTitle"/>
           </p:nvPr>
         </p:nvSpPr>
         <p:spPr>
           <a:xfrm>
-            <a:off x="3763927" y="2371060"/>
-            <a:ext cx="7739096" cy="3013741"/>
+            <a:off x="5459095" y="685800"/>
+            <a:ext cx="6043929" cy="1752599"/>
           </a:xfrm>
         </p:spPr>
         <p:txBody>
-          <a:bodyPr>
+          <a:bodyPr vert="horz" lIns="91440" tIns="45720" rIns="91440" bIns="45720" rtlCol="0" anchor="ctr">
             <a:normAutofit/>
           </a:bodyPr>
           <a:lstStyle/>
           <a:p>
-            <a:pPr algn="l"/>
-            <a:r>
-              <a:rPr lang="en-US" dirty="0"/>
-              <a:t>Explain the technologies you are using and why you selected them.</a:t>
-            </a:r>
-          </a:p>
-          <a:p>
-            <a:pPr marL="342900" indent="-342900" algn="l">
-              <a:buFont typeface="Arial" panose="020B0604020202020204" pitchFamily="34" charset="0"/>
-              <a:buChar char="•"/>
-            </a:pPr>
-            <a:r>
-              <a:rPr lang="en-US" dirty="0"/>
-              <a:t>Show a diagram of your system architecture and how the high-level components interact.</a:t>
-            </a:r>
-          </a:p>
-          <a:p>
-            <a:pPr marL="342900" indent="-342900" algn="l">
-              <a:buFont typeface="Arial" panose="020B0604020202020204" pitchFamily="34" charset="0"/>
-              <a:buChar char="•"/>
-            </a:pPr>
-            <a:endParaRPr lang="en-US" dirty="0"/>
-          </a:p>
-          <a:p>
-            <a:pPr algn="l"/>
-            <a:endParaRPr lang="en-US" dirty="0"/>
-          </a:p>
-          <a:p>
-            <a:pPr algn="l"/>
-            <a:endParaRPr lang="en-GB" dirty="0"/>
+            <a:pPr algn="ctr"/>
+            <a:r>
+              <a:rPr lang="en-US" sz="4000" dirty="0"/>
+              <a:t>Technologies &amp; System Architecture</a:t>
+            </a:r>
+          </a:p>
+        </p:txBody>
+      </p:sp>
+      <p:sp>
+        <p:nvSpPr>
+          <p:cNvPr id="32" name="Rounded Rectangle 11">
+            <a:extLst>
+              <a:ext uri="{FF2B5EF4-FFF2-40B4-BE49-F238E27FC236}">
+                <a16:creationId xmlns:a16="http://schemas.microsoft.com/office/drawing/2014/main" id="{22AD9316-8E65-4541-BA8A-A96FFE41AABC}"/>
+              </a:ext>
+              <a:ext uri="{C183D7F6-B498-43B3-948B-1728B52AA6E4}">
+                <adec:decorative xmlns:adec="http://schemas.microsoft.com/office/drawing/2017/decorative" val="1"/>
+              </a:ext>
+            </a:extLst>
+          </p:cNvPr>
+          <p:cNvSpPr>
+            <a:spLocks noGrp="1" noRot="1" noChangeAspect="1" noMove="1" noResize="1" noEditPoints="1" noAdjustHandles="1" noChangeArrowheads="1" noChangeShapeType="1" noTextEdit="1"/>
+          </p:cNvSpPr>
+          <p:nvPr>
+            <p:extLst>
+              <p:ext uri="{386F3935-93C4-4BCD-93E2-E3B085C9AB24}">
+                <p16:designElem xmlns:p16="http://schemas.microsoft.com/office/powerpoint/2015/main" val="1"/>
+              </p:ext>
+            </p:extLst>
+          </p:nvPr>
+        </p:nvSpPr>
+        <p:spPr>
+          <a:xfrm>
+            <a:off x="654347" y="648931"/>
+            <a:ext cx="4307995" cy="5231964"/>
+          </a:xfrm>
+          <a:prstGeom prst="roundRect">
+            <a:avLst>
+              <a:gd name="adj" fmla="val 4834"/>
+            </a:avLst>
+          </a:prstGeom>
+          <a:solidFill>
+            <a:schemeClr val="bg1"/>
+          </a:solidFill>
+          <a:ln w="38100">
+            <a:gradFill flip="none" rotWithShape="1">
+              <a:gsLst>
+                <a:gs pos="0">
+                  <a:schemeClr val="bg2"/>
+                </a:gs>
+                <a:gs pos="100000">
+                  <a:schemeClr val="bg2">
+                    <a:lumMod val="75000"/>
+                  </a:schemeClr>
+                </a:gs>
+              </a:gsLst>
+              <a:lin ang="5400000" scaled="0"/>
+              <a:tileRect/>
+            </a:gradFill>
+          </a:ln>
+          <a:effectLst>
+            <a:innerShdw blurRad="57150" dist="38100" dir="14460000">
+              <a:srgbClr val="000000">
+                <a:alpha val="70000"/>
+              </a:srgbClr>
+            </a:innerShdw>
+          </a:effectLst>
+        </p:spPr>
+        <p:style>
+          <a:lnRef idx="2">
+            <a:schemeClr val="accent1">
+              <a:shade val="50000"/>
+            </a:schemeClr>
+          </a:lnRef>
+          <a:fillRef idx="1">
+            <a:schemeClr val="accent1"/>
+          </a:fillRef>
+          <a:effectRef idx="0">
+            <a:schemeClr val="accent1"/>
+          </a:effectRef>
+          <a:fontRef idx="minor">
+            <a:schemeClr val="lt1"/>
+          </a:fontRef>
+        </p:style>
+        <p:txBody>
+          <a:bodyPr rtlCol="0" anchor="ctr"/>
+          <a:lstStyle/>
+          <a:p>
+            <a:pPr algn="ctr"/>
+            <a:endParaRPr lang="en-US"/>
           </a:p>
         </p:txBody>
       </p:sp>
       <p:pic>
         <p:nvPicPr>
-          <p:cNvPr id="8" name="Picture 7">
+          <p:cNvPr id="33" name="Picture 8" descr="React Native Plugin 2.7.0 – iOS &amp;amp; Android [GA] - Pendo Developers">
             <a:extLst>
               <a:ext uri="{FF2B5EF4-FFF2-40B4-BE49-F238E27FC236}">
-                <a16:creationId xmlns:a16="http://schemas.microsoft.com/office/drawing/2014/main" id="{BD3C74BF-D81A-EE41-8A2C-84C068206781}"/>
+                <a16:creationId xmlns:a16="http://schemas.microsoft.com/office/drawing/2014/main" id="{96FB9863-20BF-4DF2-B4DB-A4161659EEA9}"/>
               </a:ext>
             </a:extLst>
           </p:cNvPr>
           <p:cNvPicPr>
-            <a:picLocks noChangeAspect="1"/>
+            <a:picLocks noChangeAspect="1" noChangeArrowheads="1"/>
           </p:cNvPicPr>
           <p:nvPr/>
         </p:nvPicPr>
@@ -6785,14 +7235,403 @@
             <a:fillRect/>
           </a:stretch>
         </p:blipFill>
-        <p:spPr>
-          <a:xfrm>
-            <a:off x="5657085" y="3844259"/>
-            <a:ext cx="5845938" cy="2807012"/>
+        <p:spPr bwMode="auto">
+          <a:xfrm rot="21600000">
+            <a:off x="973583" y="757151"/>
+            <a:ext cx="3660852" cy="1262362"/>
           </a:xfrm>
           <a:prstGeom prst="rect">
             <a:avLst/>
           </a:prstGeom>
+          <a:noFill/>
+          <a:extLst>
+            <a:ext uri="{909E8E84-426E-40DD-AFC4-6F175D3DCCD1}">
+              <a14:hiddenFill xmlns:a14="http://schemas.microsoft.com/office/drawing/2010/main">
+                <a:solidFill>
+                  <a:srgbClr val="FFFFFF"/>
+                </a:solidFill>
+              </a14:hiddenFill>
+            </a:ext>
+          </a:extLst>
+        </p:spPr>
+      </p:pic>
+      <p:pic>
+        <p:nvPicPr>
+          <p:cNvPr id="34" name="Picture 14" descr="Android Studio on Behance">
+            <a:extLst>
+              <a:ext uri="{FF2B5EF4-FFF2-40B4-BE49-F238E27FC236}">
+                <a16:creationId xmlns:a16="http://schemas.microsoft.com/office/drawing/2014/main" id="{B4D0CA7D-3C83-41FD-859C-B40BED4EB0CC}"/>
+              </a:ext>
+            </a:extLst>
+          </p:cNvPr>
+          <p:cNvPicPr>
+            <a:picLocks noChangeAspect="1" noChangeArrowheads="1"/>
+          </p:cNvPicPr>
+          <p:nvPr/>
+        </p:nvPicPr>
+        <p:blipFill>
+          <a:blip r:embed="rId3">
+            <a:extLst>
+              <a:ext uri="{28A0092B-C50C-407E-A947-70E740481C1C}">
+                <a14:useLocalDpi xmlns:a14="http://schemas.microsoft.com/office/drawing/2010/main" val="0"/>
+              </a:ext>
+            </a:extLst>
+          </a:blip>
+          <a:stretch>
+            <a:fillRect/>
+          </a:stretch>
+        </p:blipFill>
+        <p:spPr bwMode="auto">
+          <a:xfrm>
+            <a:off x="900806" y="3549854"/>
+            <a:ext cx="1751808" cy="1110056"/>
+          </a:xfrm>
+          <a:prstGeom prst="rect">
+            <a:avLst/>
+          </a:prstGeom>
+          <a:noFill/>
+          <a:extLst>
+            <a:ext uri="{909E8E84-426E-40DD-AFC4-6F175D3DCCD1}">
+              <a14:hiddenFill xmlns:a14="http://schemas.microsoft.com/office/drawing/2010/main">
+                <a:solidFill>
+                  <a:srgbClr val="FFFFFF"/>
+                </a:solidFill>
+              </a14:hiddenFill>
+            </a:ext>
+          </a:extLst>
+        </p:spPr>
+      </p:pic>
+      <p:pic>
+        <p:nvPicPr>
+          <p:cNvPr id="35" name="Picture 2" descr="The Firebase Blog: Firebase expands to become a unified app platform">
+            <a:extLst>
+              <a:ext uri="{FF2B5EF4-FFF2-40B4-BE49-F238E27FC236}">
+                <a16:creationId xmlns:a16="http://schemas.microsoft.com/office/drawing/2014/main" id="{3B2C724D-1D3D-4AF9-A586-5D6ECFF34AE5}"/>
+              </a:ext>
+            </a:extLst>
+          </p:cNvPr>
+          <p:cNvPicPr>
+            <a:picLocks noChangeAspect="1" noChangeArrowheads="1"/>
+          </p:cNvPicPr>
+          <p:nvPr/>
+        </p:nvPicPr>
+        <p:blipFill>
+          <a:blip r:embed="rId4">
+            <a:extLst>
+              <a:ext uri="{28A0092B-C50C-407E-A947-70E740481C1C}">
+                <a14:useLocalDpi xmlns:a14="http://schemas.microsoft.com/office/drawing/2010/main" val="0"/>
+              </a:ext>
+            </a:extLst>
+          </a:blip>
+          <a:stretch>
+            <a:fillRect/>
+          </a:stretch>
+        </p:blipFill>
+        <p:spPr bwMode="auto">
+          <a:xfrm>
+            <a:off x="2804008" y="3655981"/>
+            <a:ext cx="1751808" cy="897801"/>
+          </a:xfrm>
+          <a:prstGeom prst="rect">
+            <a:avLst/>
+          </a:prstGeom>
+          <a:noFill/>
+          <a:extLst>
+            <a:ext uri="{909E8E84-426E-40DD-AFC4-6F175D3DCCD1}">
+              <a14:hiddenFill xmlns:a14="http://schemas.microsoft.com/office/drawing/2010/main">
+                <a:solidFill>
+                  <a:srgbClr val="FFFFFF"/>
+                </a:solidFill>
+              </a14:hiddenFill>
+            </a:ext>
+          </a:extLst>
+        </p:spPr>
+      </p:pic>
+      <p:sp>
+        <p:nvSpPr>
+          <p:cNvPr id="36" name="Subtitle 2">
+            <a:extLst>
+              <a:ext uri="{FF2B5EF4-FFF2-40B4-BE49-F238E27FC236}">
+                <a16:creationId xmlns:a16="http://schemas.microsoft.com/office/drawing/2014/main" id="{E0C4CD8B-951A-4078-B399-844576CFAB6D}"/>
+              </a:ext>
+            </a:extLst>
+          </p:cNvPr>
+          <p:cNvSpPr>
+            <a:spLocks noGrp="1"/>
+          </p:cNvSpPr>
+          <p:nvPr>
+            <p:ph type="subTitle" idx="1"/>
+          </p:nvPr>
+        </p:nvSpPr>
+        <p:spPr>
+          <a:xfrm>
+            <a:off x="5459094" y="2666999"/>
+            <a:ext cx="6043929" cy="3505201"/>
+          </a:xfrm>
+        </p:spPr>
+        <p:txBody>
+          <a:bodyPr vert="horz" lIns="91440" tIns="45720" rIns="91440" bIns="45720" rtlCol="0" anchor="ctr">
+            <a:normAutofit/>
+          </a:bodyPr>
+          <a:lstStyle/>
+          <a:p>
+            <a:pPr marL="342900" indent="-342900" algn="l">
+              <a:buFont typeface="Arial"/>
+              <a:buChar char="•"/>
+            </a:pPr>
+            <a:r>
+              <a:rPr lang="en-US" dirty="0"/>
+              <a:t>React Native – App</a:t>
+            </a:r>
+          </a:p>
+          <a:p>
+            <a:pPr marL="342900" indent="-342900" algn="l">
+              <a:buFont typeface="Arial"/>
+              <a:buChar char="•"/>
+            </a:pPr>
+            <a:r>
+              <a:rPr lang="en-US" dirty="0"/>
+              <a:t>Visual Studio Code – IDE</a:t>
+            </a:r>
+          </a:p>
+          <a:p>
+            <a:pPr marL="342900" indent="-342900" algn="l">
+              <a:buFont typeface="Arial"/>
+              <a:buChar char="•"/>
+            </a:pPr>
+            <a:r>
+              <a:rPr lang="en-US" dirty="0"/>
+              <a:t>GitHub – Version Control</a:t>
+            </a:r>
+          </a:p>
+          <a:p>
+            <a:pPr marL="342900" indent="-342900" algn="l">
+              <a:buFont typeface="Arial"/>
+              <a:buChar char="•"/>
+            </a:pPr>
+            <a:r>
+              <a:rPr lang="en-US" dirty="0"/>
+              <a:t>Android Studio – Android Emulator</a:t>
+            </a:r>
+          </a:p>
+          <a:p>
+            <a:pPr marL="342900" indent="-342900" algn="l">
+              <a:buFont typeface="Arial"/>
+              <a:buChar char="•"/>
+            </a:pPr>
+            <a:r>
+              <a:rPr lang="en-US" dirty="0"/>
+              <a:t>Firebase – Database</a:t>
+            </a:r>
+          </a:p>
+          <a:p>
+            <a:pPr marL="342900" indent="-342900" algn="l">
+              <a:buFont typeface="Arial"/>
+              <a:buChar char="•"/>
+            </a:pPr>
+            <a:r>
+              <a:rPr lang="en-US" dirty="0"/>
+              <a:t>Android – Testing Locally and Targeted Device</a:t>
+            </a:r>
+          </a:p>
+          <a:p>
+            <a:pPr marL="342900" indent="-342900" algn="l">
+              <a:buFont typeface="Arial"/>
+              <a:buChar char="•"/>
+            </a:pPr>
+            <a:r>
+              <a:rPr lang="en-US" dirty="0"/>
+              <a:t>Apple – Targeted Device (Maybe)</a:t>
+            </a:r>
+          </a:p>
+        </p:txBody>
+      </p:sp>
+      <p:pic>
+        <p:nvPicPr>
+          <p:cNvPr id="37" name="Picture 16" descr="GitHub logo and symbol, meaning, history, PNG">
+            <a:extLst>
+              <a:ext uri="{FF2B5EF4-FFF2-40B4-BE49-F238E27FC236}">
+                <a16:creationId xmlns:a16="http://schemas.microsoft.com/office/drawing/2014/main" id="{745F7364-D4D8-4E2F-B77B-8133FC9DD4F0}"/>
+              </a:ext>
+            </a:extLst>
+          </p:cNvPr>
+          <p:cNvPicPr>
+            <a:picLocks noChangeAspect="1" noChangeArrowheads="1"/>
+          </p:cNvPicPr>
+          <p:nvPr/>
+        </p:nvPicPr>
+        <p:blipFill>
+          <a:blip r:embed="rId5">
+            <a:extLst>
+              <a:ext uri="{28A0092B-C50C-407E-A947-70E740481C1C}">
+                <a14:useLocalDpi xmlns:a14="http://schemas.microsoft.com/office/drawing/2010/main" val="0"/>
+              </a:ext>
+            </a:extLst>
+          </a:blip>
+          <a:srcRect/>
+          <a:stretch>
+            <a:fillRect/>
+          </a:stretch>
+        </p:blipFill>
+        <p:spPr bwMode="auto">
+          <a:xfrm>
+            <a:off x="799542" y="2163250"/>
+            <a:ext cx="1689509" cy="950349"/>
+          </a:xfrm>
+          <a:prstGeom prst="rect">
+            <a:avLst/>
+          </a:prstGeom>
+          <a:noFill/>
+          <a:extLst>
+            <a:ext uri="{909E8E84-426E-40DD-AFC4-6F175D3DCCD1}">
+              <a14:hiddenFill xmlns:a14="http://schemas.microsoft.com/office/drawing/2010/main">
+                <a:solidFill>
+                  <a:srgbClr val="FFFFFF"/>
+                </a:solidFill>
+              </a14:hiddenFill>
+            </a:ext>
+          </a:extLst>
+        </p:spPr>
+      </p:pic>
+      <p:pic>
+        <p:nvPicPr>
+          <p:cNvPr id="38" name="Picture 18" descr="Why the Visual Studio Code team launched a snap | Snapcraft">
+            <a:extLst>
+              <a:ext uri="{FF2B5EF4-FFF2-40B4-BE49-F238E27FC236}">
+                <a16:creationId xmlns:a16="http://schemas.microsoft.com/office/drawing/2014/main" id="{AEDDAF13-72F4-4767-B6CA-0AF4A7092385}"/>
+              </a:ext>
+            </a:extLst>
+          </p:cNvPr>
+          <p:cNvPicPr>
+            <a:picLocks noChangeAspect="1" noChangeArrowheads="1"/>
+          </p:cNvPicPr>
+          <p:nvPr/>
+        </p:nvPicPr>
+        <p:blipFill>
+          <a:blip r:embed="rId6">
+            <a:extLst>
+              <a:ext uri="{28A0092B-C50C-407E-A947-70E740481C1C}">
+                <a14:useLocalDpi xmlns:a14="http://schemas.microsoft.com/office/drawing/2010/main" val="0"/>
+              </a:ext>
+            </a:extLst>
+          </a:blip>
+          <a:srcRect/>
+          <a:stretch>
+            <a:fillRect/>
+          </a:stretch>
+        </p:blipFill>
+        <p:spPr bwMode="auto">
+          <a:xfrm>
+            <a:off x="2541750" y="2137081"/>
+            <a:ext cx="2110149" cy="1055075"/>
+          </a:xfrm>
+          <a:prstGeom prst="rect">
+            <a:avLst/>
+          </a:prstGeom>
+          <a:noFill/>
+          <a:extLst>
+            <a:ext uri="{909E8E84-426E-40DD-AFC4-6F175D3DCCD1}">
+              <a14:hiddenFill xmlns:a14="http://schemas.microsoft.com/office/drawing/2010/main">
+                <a:solidFill>
+                  <a:srgbClr val="FFFFFF"/>
+                </a:solidFill>
+              </a14:hiddenFill>
+            </a:ext>
+          </a:extLst>
+        </p:spPr>
+      </p:pic>
+      <p:pic>
+        <p:nvPicPr>
+          <p:cNvPr id="39" name="Picture 20">
+            <a:extLst>
+              <a:ext uri="{FF2B5EF4-FFF2-40B4-BE49-F238E27FC236}">
+                <a16:creationId xmlns:a16="http://schemas.microsoft.com/office/drawing/2014/main" id="{CFEEA35A-85DB-4EAA-852A-F3956CC6B7B6}"/>
+              </a:ext>
+            </a:extLst>
+          </p:cNvPr>
+          <p:cNvPicPr>
+            <a:picLocks noChangeAspect="1" noChangeArrowheads="1"/>
+          </p:cNvPicPr>
+          <p:nvPr/>
+        </p:nvPicPr>
+        <p:blipFill>
+          <a:blip r:embed="rId7">
+            <a:extLst>
+              <a:ext uri="{28A0092B-C50C-407E-A947-70E740481C1C}">
+                <a14:useLocalDpi xmlns:a14="http://schemas.microsoft.com/office/drawing/2010/main" val="0"/>
+              </a:ext>
+            </a:extLst>
+          </a:blip>
+          <a:srcRect/>
+          <a:stretch>
+            <a:fillRect/>
+          </a:stretch>
+        </p:blipFill>
+        <p:spPr bwMode="auto">
+          <a:xfrm>
+            <a:off x="1434223" y="4696099"/>
+            <a:ext cx="787432" cy="936593"/>
+          </a:xfrm>
+          <a:prstGeom prst="rect">
+            <a:avLst/>
+          </a:prstGeom>
+          <a:noFill/>
+          <a:extLst>
+            <a:ext uri="{909E8E84-426E-40DD-AFC4-6F175D3DCCD1}">
+              <a14:hiddenFill xmlns:a14="http://schemas.microsoft.com/office/drawing/2010/main">
+                <a:solidFill>
+                  <a:srgbClr val="FFFFFF"/>
+                </a:solidFill>
+              </a14:hiddenFill>
+            </a:ext>
+          </a:extLst>
+        </p:spPr>
+      </p:pic>
+      <p:pic>
+        <p:nvPicPr>
+          <p:cNvPr id="40" name="Picture 22" descr="Download Apple Inc. (Apple Computer, Inc.) Logo in SVG Vector or PNG File  Format - Logo.wine">
+            <a:extLst>
+              <a:ext uri="{FF2B5EF4-FFF2-40B4-BE49-F238E27FC236}">
+                <a16:creationId xmlns:a16="http://schemas.microsoft.com/office/drawing/2014/main" id="{A8CD5A6D-C421-4D9B-8835-C1DEC42F9B60}"/>
+              </a:ext>
+            </a:extLst>
+          </p:cNvPr>
+          <p:cNvPicPr>
+            <a:picLocks noChangeAspect="1" noChangeArrowheads="1"/>
+          </p:cNvPicPr>
+          <p:nvPr/>
+        </p:nvPicPr>
+        <p:blipFill>
+          <a:blip r:embed="rId8">
+            <a:extLst>
+              <a:ext uri="{28A0092B-C50C-407E-A947-70E740481C1C}">
+                <a14:useLocalDpi xmlns:a14="http://schemas.microsoft.com/office/drawing/2010/main" val="0"/>
+              </a:ext>
+            </a:extLst>
+          </a:blip>
+          <a:srcRect/>
+          <a:stretch>
+            <a:fillRect/>
+          </a:stretch>
+        </p:blipFill>
+        <p:spPr bwMode="auto">
+          <a:xfrm>
+            <a:off x="2906956" y="4511266"/>
+            <a:ext cx="1698040" cy="1132027"/>
+          </a:xfrm>
+          <a:prstGeom prst="rect">
+            <a:avLst/>
+          </a:prstGeom>
+          <a:noFill/>
+          <a:extLst>
+            <a:ext uri="{909E8E84-426E-40DD-AFC4-6F175D3DCCD1}">
+              <a14:hiddenFill xmlns:a14="http://schemas.microsoft.com/office/drawing/2010/main">
+                <a:solidFill>
+                  <a:srgbClr val="FFFFFF"/>
+                </a:solidFill>
+              </a14:hiddenFill>
+            </a:ext>
+          </a:extLst>
         </p:spPr>
       </p:pic>
     </p:spTree>

</xml_diff>

<commit_message>
Made changes and fixes to the presentation
</commit_message>
<xml_diff>
--- a/Documents/Semester 1 Presentation.pptx
+++ b/Documents/Semester 1 Presentation.pptx
@@ -989,9 +989,9 @@
             <c:numRef>
               <c:f>Sheet1!$F$2:$F$6</c:f>
               <c:numCache>
-                <c:formatCode>mmm\-yy</c:formatCode>
+                <c:formatCode>General</c:formatCode>
                 <c:ptCount val="5"/>
-                <c:pt idx="4">
+                <c:pt idx="4" formatCode="mmm\-yy">
                   <c:v>44652</c:v>
                 </c:pt>
               </c:numCache>
@@ -8117,7 +8117,7 @@
         </p:nvSpPr>
         <p:spPr>
           <a:xfrm>
-            <a:off x="2928401" y="1380069"/>
+            <a:off x="2928400" y="280784"/>
             <a:ext cx="8574622" cy="788974"/>
           </a:xfrm>
         </p:spPr>
@@ -8150,8 +8150,8 @@
         </p:nvSpPr>
         <p:spPr>
           <a:xfrm>
-            <a:off x="3763927" y="2371060"/>
-            <a:ext cx="7739096" cy="3013741"/>
+            <a:off x="4083727" y="1136343"/>
+            <a:ext cx="7419295" cy="4687408"/>
           </a:xfrm>
         </p:spPr>
         <p:txBody>
@@ -8163,7 +8163,7 @@
             <a:pPr algn="l"/>
             <a:r>
               <a:rPr lang="en-US" dirty="0"/>
-              <a:t>Developing a timetable Mobile Application. With additional security features.</a:t>
+              <a:t>Developing a functional Timetable Mobile Application.</a:t>
             </a:r>
           </a:p>
           <a:p>
@@ -8173,7 +8173,7 @@
             </a:pPr>
             <a:r>
               <a:rPr lang="en-US" dirty="0"/>
-              <a:t>Upload App to the Google Store and maybe Apple App Store.</a:t>
+              <a:t>Add, Delete, Edit classes.</a:t>
             </a:r>
           </a:p>
           <a:p>
@@ -8183,7 +8183,7 @@
             </a:pPr>
             <a:r>
               <a:rPr lang="en-US" dirty="0"/>
-              <a:t>Security features such as PIN, Fingerprint and hopefully Google Two-Factor Authentication.</a:t>
+              <a:t>Dark mode.</a:t>
             </a:r>
           </a:p>
           <a:p>
@@ -8193,7 +8193,7 @@
             </a:pPr>
             <a:r>
               <a:rPr lang="en-US" dirty="0"/>
-              <a:t>Develop an easy-to-use application.</a:t>
+              <a:t>Upload App to the Google Store and Apple App Store.</a:t>
             </a:r>
           </a:p>
           <a:p>
@@ -8203,7 +8203,47 @@
             </a:pPr>
             <a:r>
               <a:rPr lang="en-US" dirty="0"/>
-              <a:t>Good design of the application.</a:t>
+              <a:t>Security of email, password and Google Two-Factor Authentication.</a:t>
+            </a:r>
+          </a:p>
+          <a:p>
+            <a:pPr marL="342900" indent="-342900" algn="l">
+              <a:buFont typeface="Arial" panose="020B0604020202020204" pitchFamily="34" charset="0"/>
+              <a:buChar char="•"/>
+            </a:pPr>
+            <a:r>
+              <a:rPr lang="en-US" dirty="0"/>
+              <a:t>Easy to use.</a:t>
+            </a:r>
+          </a:p>
+          <a:p>
+            <a:pPr marL="342900" indent="-342900" algn="l">
+              <a:buFont typeface="Arial" panose="020B0604020202020204" pitchFamily="34" charset="0"/>
+              <a:buChar char="•"/>
+            </a:pPr>
+            <a:r>
+              <a:rPr lang="en-US" dirty="0"/>
+              <a:t>Good design.</a:t>
+            </a:r>
+          </a:p>
+          <a:p>
+            <a:pPr marL="342900" indent="-342900" algn="l">
+              <a:buFont typeface="Arial" panose="020B0604020202020204" pitchFamily="34" charset="0"/>
+              <a:buChar char="•"/>
+            </a:pPr>
+            <a:r>
+              <a:rPr lang="en-US" dirty="0"/>
+              <a:t>Merging Data on loss of Internet Connection.</a:t>
+            </a:r>
+          </a:p>
+          <a:p>
+            <a:pPr marL="342900" indent="-342900" algn="l">
+              <a:buFont typeface="Arial" panose="020B0604020202020204" pitchFamily="34" charset="0"/>
+              <a:buChar char="•"/>
+            </a:pPr>
+            <a:r>
+              <a:rPr lang="en-US" dirty="0"/>
+              <a:t>Forgotten Password Functionality.</a:t>
             </a:r>
           </a:p>
         </p:txBody>
@@ -9409,12 +9449,24 @@
         </p:blipFill>
         <p:spPr>
           <a:xfrm>
-            <a:off x="4045131" y="975361"/>
-            <a:ext cx="1950730" cy="2947416"/>
+            <a:off x="233464" y="205421"/>
+            <a:ext cx="3235066" cy="3121438"/>
           </a:xfrm>
           <a:prstGeom prst="rect">
             <a:avLst/>
           </a:prstGeom>
+          <a:ln w="88900" cap="sq" cmpd="thickThin">
+            <a:solidFill>
+              <a:srgbClr val="000000"/>
+            </a:solidFill>
+            <a:prstDash val="solid"/>
+            <a:miter lim="800000"/>
+          </a:ln>
+          <a:effectLst>
+            <a:innerShdw blurRad="76200">
+              <a:srgbClr val="000000"/>
+            </a:innerShdw>
+          </a:effectLst>
         </p:spPr>
       </p:pic>
       <p:pic>
@@ -9439,15 +9491,24 @@
         </p:blipFill>
         <p:spPr>
           <a:xfrm>
-            <a:off x="6326405" y="975360"/>
-            <a:ext cx="1879766" cy="2947416"/>
+            <a:off x="233464" y="3531141"/>
+            <a:ext cx="3235066" cy="3121438"/>
           </a:xfrm>
           <a:prstGeom prst="rect">
             <a:avLst/>
           </a:prstGeom>
-          <a:ln w="53975">
-            <a:noFill/>
+          <a:ln w="88900" cap="sq" cmpd="thickThin">
+            <a:solidFill>
+              <a:srgbClr val="000000"/>
+            </a:solidFill>
+            <a:prstDash val="solid"/>
+            <a:miter lim="800000"/>
           </a:ln>
+          <a:effectLst>
+            <a:innerShdw blurRad="76200">
+              <a:srgbClr val="000000"/>
+            </a:innerShdw>
+          </a:effectLst>
         </p:spPr>
       </p:pic>
       <p:pic>
@@ -9472,7 +9533,7 @@
         </p:blipFill>
         <p:spPr>
           <a:xfrm>
-            <a:off x="8328488" y="975360"/>
+            <a:off x="8199184" y="975360"/>
             <a:ext cx="1385285" cy="2947416"/>
           </a:xfrm>
           <a:prstGeom prst="rect">
@@ -9505,7 +9566,7 @@
         </p:blipFill>
         <p:spPr>
           <a:xfrm>
-            <a:off x="9836090" y="975360"/>
+            <a:off x="9916604" y="975360"/>
             <a:ext cx="1385286" cy="2947415"/>
           </a:xfrm>
           <a:prstGeom prst="rect">
@@ -9514,6 +9575,78 @@
           <a:ln w="53975">
             <a:noFill/>
           </a:ln>
+        </p:spPr>
+      </p:pic>
+      <p:pic>
+        <p:nvPicPr>
+          <p:cNvPr id="4" name="Picture 3" descr="Graphical user interface, application&#10;&#10;Description automatically generated">
+            <a:extLst>
+              <a:ext uri="{FF2B5EF4-FFF2-40B4-BE49-F238E27FC236}">
+                <a16:creationId xmlns:a16="http://schemas.microsoft.com/office/drawing/2014/main" id="{5CEA2555-8DDA-4F66-8E4F-5750D62ABC52}"/>
+              </a:ext>
+            </a:extLst>
+          </p:cNvPr>
+          <p:cNvPicPr>
+            <a:picLocks noChangeAspect="1"/>
+          </p:cNvPicPr>
+          <p:nvPr/>
+        </p:nvPicPr>
+        <p:blipFill>
+          <a:blip r:embed="rId7">
+            <a:extLst>
+              <a:ext uri="{28A0092B-C50C-407E-A947-70E740481C1C}">
+                <a14:useLocalDpi xmlns:a14="http://schemas.microsoft.com/office/drawing/2010/main" val="0"/>
+              </a:ext>
+            </a:extLst>
+          </a:blip>
+          <a:stretch>
+            <a:fillRect/>
+          </a:stretch>
+        </p:blipFill>
+        <p:spPr>
+          <a:xfrm>
+            <a:off x="4050695" y="975360"/>
+            <a:ext cx="1385285" cy="2947415"/>
+          </a:xfrm>
+          <a:prstGeom prst="rect">
+            <a:avLst/>
+          </a:prstGeom>
+        </p:spPr>
+      </p:pic>
+      <p:pic>
+        <p:nvPicPr>
+          <p:cNvPr id="6" name="Picture 5" descr="Graphical user interface, application&#10;&#10;Description automatically generated">
+            <a:extLst>
+              <a:ext uri="{FF2B5EF4-FFF2-40B4-BE49-F238E27FC236}">
+                <a16:creationId xmlns:a16="http://schemas.microsoft.com/office/drawing/2014/main" id="{59A8E94A-AB00-4AC2-9AD3-5057EBD78101}"/>
+              </a:ext>
+            </a:extLst>
+          </p:cNvPr>
+          <p:cNvPicPr>
+            <a:picLocks noChangeAspect="1"/>
+          </p:cNvPicPr>
+          <p:nvPr/>
+        </p:nvPicPr>
+        <p:blipFill>
+          <a:blip r:embed="rId8">
+            <a:extLst>
+              <a:ext uri="{28A0092B-C50C-407E-A947-70E740481C1C}">
+                <a14:useLocalDpi xmlns:a14="http://schemas.microsoft.com/office/drawing/2010/main" val="0"/>
+              </a:ext>
+            </a:extLst>
+          </a:blip>
+          <a:stretch>
+            <a:fillRect/>
+          </a:stretch>
+        </p:blipFill>
+        <p:spPr>
+          <a:xfrm>
+            <a:off x="6065131" y="975360"/>
+            <a:ext cx="1504902" cy="2947415"/>
+          </a:xfrm>
+          <a:prstGeom prst="rect">
+            <a:avLst/>
+          </a:prstGeom>
         </p:spPr>
       </p:pic>
     </p:spTree>

</xml_diff>

<commit_message>
Made change to Dissertation Date on Slide 5
</commit_message>
<xml_diff>
--- a/Documents/Semester 1 Presentation.pptx
+++ b/Documents/Semester 1 Presentation.pptx
@@ -989,9 +989,12 @@
             <c:numRef>
               <c:f>Sheet1!$F$2:$F$6</c:f>
               <c:numCache>
-                <c:formatCode>General</c:formatCode>
+                <c:formatCode>mmm\-yy</c:formatCode>
                 <c:ptCount val="5"/>
-                <c:pt idx="4" formatCode="mmm\-yy">
+                <c:pt idx="3">
+                  <c:v>44652</c:v>
+                </c:pt>
+                <c:pt idx="4">
                   <c:v>44652</c:v>
                 </c:pt>
               </c:numCache>
@@ -2196,7 +2199,7 @@
           <a:p>
             <a:fld id="{2E3F47AE-4804-4655-8D11-C2BEE1A314EC}" type="datetimeFigureOut">
               <a:rPr lang="en-GB" smtClean="0"/>
-              <a:t>14/12/2021</a:t>
+              <a:t>15/12/2021</a:t>
             </a:fld>
             <a:endParaRPr lang="en-GB"/>
           </a:p>
@@ -2492,7 +2495,7 @@
           <a:p>
             <a:fld id="{2E3F47AE-4804-4655-8D11-C2BEE1A314EC}" type="datetimeFigureOut">
               <a:rPr lang="en-GB" smtClean="0"/>
-              <a:t>14/12/2021</a:t>
+              <a:t>15/12/2021</a:t>
             </a:fld>
             <a:endParaRPr lang="en-GB"/>
           </a:p>
@@ -2740,7 +2743,7 @@
           <a:p>
             <a:fld id="{2E3F47AE-4804-4655-8D11-C2BEE1A314EC}" type="datetimeFigureOut">
               <a:rPr lang="en-GB" smtClean="0"/>
-              <a:t>14/12/2021</a:t>
+              <a:t>15/12/2021</a:t>
             </a:fld>
             <a:endParaRPr lang="en-GB"/>
           </a:p>
@@ -3280,7 +3283,7 @@
           <a:p>
             <a:fld id="{2E3F47AE-4804-4655-8D11-C2BEE1A314EC}" type="datetimeFigureOut">
               <a:rPr lang="en-GB" smtClean="0"/>
-              <a:t>14/12/2021</a:t>
+              <a:t>15/12/2021</a:t>
             </a:fld>
             <a:endParaRPr lang="en-GB"/>
           </a:p>
@@ -3528,7 +3531,7 @@
           <a:p>
             <a:fld id="{2E3F47AE-4804-4655-8D11-C2BEE1A314EC}" type="datetimeFigureOut">
               <a:rPr lang="en-GB" smtClean="0"/>
-              <a:t>14/12/2021</a:t>
+              <a:t>15/12/2021</a:t>
             </a:fld>
             <a:endParaRPr lang="en-GB"/>
           </a:p>
@@ -4060,7 +4063,7 @@
           <a:p>
             <a:fld id="{2E3F47AE-4804-4655-8D11-C2BEE1A314EC}" type="datetimeFigureOut">
               <a:rPr lang="en-GB" smtClean="0"/>
-              <a:t>14/12/2021</a:t>
+              <a:t>15/12/2021</a:t>
             </a:fld>
             <a:endParaRPr lang="en-GB"/>
           </a:p>
@@ -4357,7 +4360,7 @@
           <a:p>
             <a:fld id="{2E3F47AE-4804-4655-8D11-C2BEE1A314EC}" type="datetimeFigureOut">
               <a:rPr lang="en-GB" smtClean="0"/>
-              <a:t>14/12/2021</a:t>
+              <a:t>15/12/2021</a:t>
             </a:fld>
             <a:endParaRPr lang="en-GB"/>
           </a:p>
@@ -4531,7 +4534,7 @@
           <a:p>
             <a:fld id="{2E3F47AE-4804-4655-8D11-C2BEE1A314EC}" type="datetimeFigureOut">
               <a:rPr lang="en-GB" smtClean="0"/>
-              <a:t>14/12/2021</a:t>
+              <a:t>15/12/2021</a:t>
             </a:fld>
             <a:endParaRPr lang="en-GB"/>
           </a:p>
@@ -4711,7 +4714,7 @@
           <a:p>
             <a:fld id="{2E3F47AE-4804-4655-8D11-C2BEE1A314EC}" type="datetimeFigureOut">
               <a:rPr lang="en-GB" smtClean="0"/>
-              <a:t>14/12/2021</a:t>
+              <a:t>15/12/2021</a:t>
             </a:fld>
             <a:endParaRPr lang="en-GB"/>
           </a:p>
@@ -4881,7 +4884,7 @@
           <a:p>
             <a:fld id="{2E3F47AE-4804-4655-8D11-C2BEE1A314EC}" type="datetimeFigureOut">
               <a:rPr lang="en-GB" smtClean="0"/>
-              <a:t>14/12/2021</a:t>
+              <a:t>15/12/2021</a:t>
             </a:fld>
             <a:endParaRPr lang="en-GB"/>
           </a:p>
@@ -5132,7 +5135,7 @@
           <a:p>
             <a:fld id="{2E3F47AE-4804-4655-8D11-C2BEE1A314EC}" type="datetimeFigureOut">
               <a:rPr lang="en-GB" smtClean="0"/>
-              <a:t>14/12/2021</a:t>
+              <a:t>15/12/2021</a:t>
             </a:fld>
             <a:endParaRPr lang="en-GB"/>
           </a:p>
@@ -5429,7 +5432,7 @@
           <a:p>
             <a:fld id="{2E3F47AE-4804-4655-8D11-C2BEE1A314EC}" type="datetimeFigureOut">
               <a:rPr lang="en-GB" smtClean="0"/>
-              <a:t>14/12/2021</a:t>
+              <a:t>15/12/2021</a:t>
             </a:fld>
             <a:endParaRPr lang="en-GB"/>
           </a:p>
@@ -5871,7 +5874,7 @@
           <a:p>
             <a:fld id="{2E3F47AE-4804-4655-8D11-C2BEE1A314EC}" type="datetimeFigureOut">
               <a:rPr lang="en-GB" smtClean="0"/>
-              <a:t>14/12/2021</a:t>
+              <a:t>15/12/2021</a:t>
             </a:fld>
             <a:endParaRPr lang="en-GB"/>
           </a:p>
@@ -5989,7 +5992,7 @@
           <a:p>
             <a:fld id="{2E3F47AE-4804-4655-8D11-C2BEE1A314EC}" type="datetimeFigureOut">
               <a:rPr lang="en-GB" smtClean="0"/>
-              <a:t>14/12/2021</a:t>
+              <a:t>15/12/2021</a:t>
             </a:fld>
             <a:endParaRPr lang="en-GB"/>
           </a:p>
@@ -6084,7 +6087,7 @@
           <a:p>
             <a:fld id="{2E3F47AE-4804-4655-8D11-C2BEE1A314EC}" type="datetimeFigureOut">
               <a:rPr lang="en-GB" smtClean="0"/>
-              <a:t>14/12/2021</a:t>
+              <a:t>15/12/2021</a:t>
             </a:fld>
             <a:endParaRPr lang="en-GB"/>
           </a:p>
@@ -6367,7 +6370,7 @@
           <a:p>
             <a:fld id="{2E3F47AE-4804-4655-8D11-C2BEE1A314EC}" type="datetimeFigureOut">
               <a:rPr lang="en-GB" smtClean="0"/>
-              <a:t>14/12/2021</a:t>
+              <a:t>15/12/2021</a:t>
             </a:fld>
             <a:endParaRPr lang="en-GB"/>
           </a:p>
@@ -6658,7 +6661,7 @@
           <a:p>
             <a:fld id="{2E3F47AE-4804-4655-8D11-C2BEE1A314EC}" type="datetimeFigureOut">
               <a:rPr lang="en-GB" smtClean="0"/>
-              <a:t>14/12/2021</a:t>
+              <a:t>15/12/2021</a:t>
             </a:fld>
             <a:endParaRPr lang="en-GB"/>
           </a:p>
@@ -7188,7 +7191,7 @@
           <a:p>
             <a:fld id="{2E3F47AE-4804-4655-8D11-C2BEE1A314EC}" type="datetimeFigureOut">
               <a:rPr lang="en-GB" smtClean="0"/>
-              <a:t>14/12/2021</a:t>
+              <a:t>15/12/2021</a:t>
             </a:fld>
             <a:endParaRPr lang="en-GB"/>
           </a:p>
@@ -10269,7 +10272,7 @@
           <p:nvPr>
             <p:extLst>
               <p:ext uri="{D42A27DB-BD31-4B8C-83A1-F6EECF244321}">
-                <p14:modId xmlns:p14="http://schemas.microsoft.com/office/powerpoint/2010/main" val="1410587684"/>
+                <p14:modId xmlns:p14="http://schemas.microsoft.com/office/powerpoint/2010/main" val="1939898602"/>
               </p:ext>
             </p:extLst>
           </p:nvPr>

</xml_diff>